<commit_message>
modified:   docs/_config.yml 	modified:   docs/_static/custom.css 	new file:   docs/_static/tdc_logo_5.png 	new file:   docs/_static/tdc_logo_6.png 	new file:   docs/_static/tdc_logo_7.png 	modified:   docs/_toc.yml 	new file:   docs/dc/ _md/_Untitled.md 	modified:   docs/dc/ _md/_myst.md 	new file:   docs/dc/.ipynb_checkpoints/Untitled-checkpoint.ipynb 	new file:   docs/dc/.ipynb_checkpoints/Untitled1-checkpoint.md 	modified:   docs/dc/.ipynb_checkpoints/myst-checkpoint.ipynb 	new file:   docs/dc/Untitled.ipynb 	new file:   docs/dc/Untitled1.md 	modified:   docs/dc/jb/ghp.md 	modified:   docs/dc/jb/toc.md 	modified:   docs/dc/myst.ipynb 	modified:   docs/img/logo2.pptx 	new file:   docs/img/tdc_logo_5.png 	new file:   docs/img/~$logo2.pptx 	new file:   docs/jn/ _md/_is.md 	modified:   docs/jn/.ipynb_checkpoints/is-checkpoint.ipynb 	modified:   docs/jn/is.ipynb 	modified:   pdm.lock 	modified:   pyproject.toml
</commit_message>
<xml_diff>
--- a/docs/img/logo2.pptx
+++ b/docs/img/logo2.pptx
@@ -8,6 +8,8 @@
     <p:sldId id="257" r:id="rId2"/>
     <p:sldId id="258" r:id="rId3"/>
     <p:sldId id="259" r:id="rId4"/>
+    <p:sldId id="260" r:id="rId5"/>
+    <p:sldId id="261" r:id="rId6"/>
   </p:sldIdLst>
   <p:sldSz cx="12192000" cy="6858000"/>
   <p:notesSz cx="6858000" cy="9144000"/>
@@ -261,7 +263,7 @@
           <a:p>
             <a:fld id="{5E7F9CF3-CE92-4992-BA1D-CAA1D10CF0B4}" type="datetimeFigureOut">
               <a:rPr lang="ko-KR" altLang="en-US" smtClean="0"/>
-              <a:t>2023-06-19</a:t>
+              <a:t>2023-06-22</a:t>
             </a:fld>
             <a:endParaRPr lang="ko-KR" altLang="en-US"/>
           </a:p>
@@ -459,7 +461,7 @@
           <a:p>
             <a:fld id="{5E7F9CF3-CE92-4992-BA1D-CAA1D10CF0B4}" type="datetimeFigureOut">
               <a:rPr lang="ko-KR" altLang="en-US" smtClean="0"/>
-              <a:t>2023-06-19</a:t>
+              <a:t>2023-06-22</a:t>
             </a:fld>
             <a:endParaRPr lang="ko-KR" altLang="en-US"/>
           </a:p>
@@ -667,7 +669,7 @@
           <a:p>
             <a:fld id="{5E7F9CF3-CE92-4992-BA1D-CAA1D10CF0B4}" type="datetimeFigureOut">
               <a:rPr lang="ko-KR" altLang="en-US" smtClean="0"/>
-              <a:t>2023-06-19</a:t>
+              <a:t>2023-06-22</a:t>
             </a:fld>
             <a:endParaRPr lang="ko-KR" altLang="en-US"/>
           </a:p>
@@ -865,7 +867,7 @@
           <a:p>
             <a:fld id="{5E7F9CF3-CE92-4992-BA1D-CAA1D10CF0B4}" type="datetimeFigureOut">
               <a:rPr lang="ko-KR" altLang="en-US" smtClean="0"/>
-              <a:t>2023-06-19</a:t>
+              <a:t>2023-06-22</a:t>
             </a:fld>
             <a:endParaRPr lang="ko-KR" altLang="en-US"/>
           </a:p>
@@ -1140,7 +1142,7 @@
           <a:p>
             <a:fld id="{5E7F9CF3-CE92-4992-BA1D-CAA1D10CF0B4}" type="datetimeFigureOut">
               <a:rPr lang="ko-KR" altLang="en-US" smtClean="0"/>
-              <a:t>2023-06-19</a:t>
+              <a:t>2023-06-22</a:t>
             </a:fld>
             <a:endParaRPr lang="ko-KR" altLang="en-US"/>
           </a:p>
@@ -1405,7 +1407,7 @@
           <a:p>
             <a:fld id="{5E7F9CF3-CE92-4992-BA1D-CAA1D10CF0B4}" type="datetimeFigureOut">
               <a:rPr lang="ko-KR" altLang="en-US" smtClean="0"/>
-              <a:t>2023-06-19</a:t>
+              <a:t>2023-06-22</a:t>
             </a:fld>
             <a:endParaRPr lang="ko-KR" altLang="en-US"/>
           </a:p>
@@ -1817,7 +1819,7 @@
           <a:p>
             <a:fld id="{5E7F9CF3-CE92-4992-BA1D-CAA1D10CF0B4}" type="datetimeFigureOut">
               <a:rPr lang="ko-KR" altLang="en-US" smtClean="0"/>
-              <a:t>2023-06-19</a:t>
+              <a:t>2023-06-22</a:t>
             </a:fld>
             <a:endParaRPr lang="ko-KR" altLang="en-US"/>
           </a:p>
@@ -1958,7 +1960,7 @@
           <a:p>
             <a:fld id="{5E7F9CF3-CE92-4992-BA1D-CAA1D10CF0B4}" type="datetimeFigureOut">
               <a:rPr lang="ko-KR" altLang="en-US" smtClean="0"/>
-              <a:t>2023-06-19</a:t>
+              <a:t>2023-06-22</a:t>
             </a:fld>
             <a:endParaRPr lang="ko-KR" altLang="en-US"/>
           </a:p>
@@ -2071,7 +2073,7 @@
           <a:p>
             <a:fld id="{5E7F9CF3-CE92-4992-BA1D-CAA1D10CF0B4}" type="datetimeFigureOut">
               <a:rPr lang="ko-KR" altLang="en-US" smtClean="0"/>
-              <a:t>2023-06-19</a:t>
+              <a:t>2023-06-22</a:t>
             </a:fld>
             <a:endParaRPr lang="ko-KR" altLang="en-US"/>
           </a:p>
@@ -2382,7 +2384,7 @@
           <a:p>
             <a:fld id="{5E7F9CF3-CE92-4992-BA1D-CAA1D10CF0B4}" type="datetimeFigureOut">
               <a:rPr lang="ko-KR" altLang="en-US" smtClean="0"/>
-              <a:t>2023-06-19</a:t>
+              <a:t>2023-06-22</a:t>
             </a:fld>
             <a:endParaRPr lang="ko-KR" altLang="en-US"/>
           </a:p>
@@ -2670,7 +2672,7 @@
           <a:p>
             <a:fld id="{5E7F9CF3-CE92-4992-BA1D-CAA1D10CF0B4}" type="datetimeFigureOut">
               <a:rPr lang="ko-KR" altLang="en-US" smtClean="0"/>
-              <a:t>2023-06-19</a:t>
+              <a:t>2023-06-22</a:t>
             </a:fld>
             <a:endParaRPr lang="ko-KR" altLang="en-US"/>
           </a:p>
@@ -2911,7 +2913,7 @@
           <a:p>
             <a:fld id="{5E7F9CF3-CE92-4992-BA1D-CAA1D10CF0B4}" type="datetimeFigureOut">
               <a:rPr lang="ko-KR" altLang="en-US" smtClean="0"/>
-              <a:t>2023-06-19</a:t>
+              <a:t>2023-06-22</a:t>
             </a:fld>
             <a:endParaRPr lang="ko-KR" altLang="en-US"/>
           </a:p>
@@ -3832,6 +3834,99 @@
           </a:p>
         </p:txBody>
       </p:sp>
+      <p:sp>
+        <p:nvSpPr>
+          <p:cNvPr id="6" name="사각형: 둥근 대각선 방향 모서리 5">
+            <a:extLst>
+              <a:ext uri="{FF2B5EF4-FFF2-40B4-BE49-F238E27FC236}">
+                <a16:creationId xmlns:a16="http://schemas.microsoft.com/office/drawing/2014/main" id="{D6A82080-0DB2-4EC8-AEC5-DF0BD0D2DEB6}"/>
+              </a:ext>
+            </a:extLst>
+          </p:cNvPr>
+          <p:cNvSpPr/>
+          <p:nvPr/>
+        </p:nvSpPr>
+        <p:spPr>
+          <a:xfrm>
+            <a:off x="4783816" y="1376156"/>
+            <a:ext cx="5983462" cy="1860189"/>
+          </a:xfrm>
+          <a:prstGeom prst="round2DiagRect">
+            <a:avLst/>
+          </a:prstGeom>
+          <a:noFill/>
+          <a:ln>
+            <a:noFill/>
+          </a:ln>
+        </p:spPr>
+        <p:style>
+          <a:lnRef idx="2">
+            <a:schemeClr val="accent1">
+              <a:shade val="50000"/>
+            </a:schemeClr>
+          </a:lnRef>
+          <a:fillRef idx="1">
+            <a:schemeClr val="accent1"/>
+          </a:fillRef>
+          <a:effectRef idx="0">
+            <a:schemeClr val="accent1"/>
+          </a:effectRef>
+          <a:fontRef idx="minor">
+            <a:schemeClr val="lt1"/>
+          </a:fontRef>
+        </p:style>
+        <p:txBody>
+          <a:bodyPr rtlCol="0" anchor="ctr"/>
+          <a:lstStyle/>
+          <a:p>
+            <a:pPr algn="ctr">
+              <a:spcAft>
+                <a:spcPts val="600"/>
+              </a:spcAft>
+            </a:pPr>
+            <a:r>
+              <a:rPr lang="en-US" altLang="ko-KR" sz="13800" dirty="0">
+                <a:solidFill>
+                  <a:srgbClr val="00B0F0"/>
+                </a:solidFill>
+                <a:latin typeface="Segoe UI Black" panose="020B0A02040204020203" pitchFamily="34" charset="0"/>
+                <a:ea typeface="Segoe UI Black" panose="020B0A02040204020203" pitchFamily="34" charset="0"/>
+              </a:rPr>
+              <a:t>T</a:t>
+            </a:r>
+            <a:r>
+              <a:rPr lang="en-US" altLang="ko-KR" sz="13800" dirty="0">
+                <a:solidFill>
+                  <a:schemeClr val="tx1"/>
+                </a:solidFill>
+                <a:latin typeface="Segoe UI Black" panose="020B0A02040204020203" pitchFamily="34" charset="0"/>
+                <a:ea typeface="Segoe UI Black" panose="020B0A02040204020203" pitchFamily="34" charset="0"/>
+              </a:rPr>
+              <a:t>.</a:t>
+            </a:r>
+            <a:r>
+              <a:rPr lang="en-US" altLang="ko-KR" sz="13800" dirty="0">
+                <a:solidFill>
+                  <a:srgbClr val="FF0000"/>
+                </a:solidFill>
+                <a:latin typeface="Segoe UI Black" panose="020B0A02040204020203" pitchFamily="34" charset="0"/>
+                <a:ea typeface="Segoe UI Black" panose="020B0A02040204020203" pitchFamily="34" charset="0"/>
+              </a:rPr>
+              <a:t>D</a:t>
+            </a:r>
+            <a:r>
+              <a:rPr lang="en-US" altLang="ko-KR" sz="13800" dirty="0">
+                <a:solidFill>
+                  <a:schemeClr val="tx1"/>
+                </a:solidFill>
+                <a:latin typeface="Segoe UI Black" panose="020B0A02040204020203" pitchFamily="34" charset="0"/>
+                <a:ea typeface="Segoe UI Black" panose="020B0A02040204020203" pitchFamily="34" charset="0"/>
+              </a:rPr>
+              <a:t>.C</a:t>
+            </a:r>
+          </a:p>
+        </p:txBody>
+      </p:sp>
     </p:spTree>
     <p:extLst>
       <p:ext uri="{BB962C8B-B14F-4D97-AF65-F5344CB8AC3E}">
@@ -3986,6 +4081,192 @@
     <p:extLst>
       <p:ext uri="{BB962C8B-B14F-4D97-AF65-F5344CB8AC3E}">
         <p14:creationId xmlns:p14="http://schemas.microsoft.com/office/powerpoint/2010/main" val="1987139248"/>
+      </p:ext>
+    </p:extLst>
+  </p:cSld>
+  <p:clrMapOvr>
+    <a:masterClrMapping/>
+  </p:clrMapOvr>
+</p:sld>
+</file>
+
+<file path=ppt/slides/slide4.xml><?xml version="1.0" encoding="utf-8"?>
+<p:sld xmlns:a="http://schemas.openxmlformats.org/drawingml/2006/main" xmlns:r="http://schemas.openxmlformats.org/officeDocument/2006/relationships" xmlns:p="http://schemas.openxmlformats.org/presentationml/2006/main">
+  <p:cSld>
+    <p:spTree>
+      <p:nvGrpSpPr>
+        <p:cNvPr id="1" name=""/>
+        <p:cNvGrpSpPr/>
+        <p:nvPr/>
+      </p:nvGrpSpPr>
+      <p:grpSpPr>
+        <a:xfrm>
+          <a:off x="0" y="0"/>
+          <a:ext cx="0" cy="0"/>
+          <a:chOff x="0" y="0"/>
+          <a:chExt cx="0" cy="0"/>
+        </a:xfrm>
+      </p:grpSpPr>
+      <p:sp>
+        <p:nvSpPr>
+          <p:cNvPr id="2" name="사각형: 둥근 대각선 방향 모서리 1">
+            <a:extLst>
+              <a:ext uri="{FF2B5EF4-FFF2-40B4-BE49-F238E27FC236}">
+                <a16:creationId xmlns:a16="http://schemas.microsoft.com/office/drawing/2014/main" id="{B2B8F6D3-3D31-4ECA-B779-7D6A95E32457}"/>
+              </a:ext>
+            </a:extLst>
+          </p:cNvPr>
+          <p:cNvSpPr/>
+          <p:nvPr/>
+        </p:nvSpPr>
+        <p:spPr>
+          <a:xfrm>
+            <a:off x="1656360" y="2165673"/>
+            <a:ext cx="8483250" cy="2526654"/>
+          </a:xfrm>
+          <a:prstGeom prst="round2DiagRect">
+            <a:avLst/>
+          </a:prstGeom>
+          <a:noFill/>
+          <a:ln>
+            <a:noFill/>
+          </a:ln>
+        </p:spPr>
+        <p:style>
+          <a:lnRef idx="2">
+            <a:schemeClr val="accent1">
+              <a:shade val="50000"/>
+            </a:schemeClr>
+          </a:lnRef>
+          <a:fillRef idx="1">
+            <a:schemeClr val="accent1"/>
+          </a:fillRef>
+          <a:effectRef idx="0">
+            <a:schemeClr val="accent1"/>
+          </a:effectRef>
+          <a:fontRef idx="minor">
+            <a:schemeClr val="lt1"/>
+          </a:fontRef>
+        </p:style>
+        <p:txBody>
+          <a:bodyPr wrap="none" lIns="0" tIns="0" rIns="0" bIns="0" rtlCol="0" anchor="ctr">
+            <a:spAutoFit/>
+          </a:bodyPr>
+          <a:lstStyle/>
+          <a:p>
+            <a:pPr algn="ctr"/>
+            <a:r>
+              <a:rPr lang="en-US" altLang="ko-KR" sz="23900" dirty="0">
+                <a:solidFill>
+                  <a:srgbClr val="00B0F0"/>
+                </a:solidFill>
+                <a:latin typeface="Segoe UI Black" panose="020B0A02040204020203" pitchFamily="34" charset="0"/>
+                <a:ea typeface="Segoe UI Black" panose="020B0A02040204020203" pitchFamily="34" charset="0"/>
+              </a:rPr>
+              <a:t>T</a:t>
+            </a:r>
+            <a:r>
+              <a:rPr lang="en-US" altLang="ko-KR" sz="23900" dirty="0">
+                <a:solidFill>
+                  <a:schemeClr val="tx1"/>
+                </a:solidFill>
+                <a:latin typeface="Segoe UI Black" panose="020B0A02040204020203" pitchFamily="34" charset="0"/>
+                <a:ea typeface="Segoe UI Black" panose="020B0A02040204020203" pitchFamily="34" charset="0"/>
+              </a:rPr>
+              <a:t>.</a:t>
+            </a:r>
+            <a:r>
+              <a:rPr lang="en-US" altLang="ko-KR" sz="23900" dirty="0">
+                <a:solidFill>
+                  <a:srgbClr val="FF0000"/>
+                </a:solidFill>
+                <a:latin typeface="Segoe UI Black" panose="020B0A02040204020203" pitchFamily="34" charset="0"/>
+                <a:ea typeface="Segoe UI Black" panose="020B0A02040204020203" pitchFamily="34" charset="0"/>
+              </a:rPr>
+              <a:t>D</a:t>
+            </a:r>
+            <a:r>
+              <a:rPr lang="en-US" altLang="ko-KR" sz="23900" dirty="0">
+                <a:solidFill>
+                  <a:schemeClr val="tx1"/>
+                </a:solidFill>
+                <a:latin typeface="Segoe UI Black" panose="020B0A02040204020203" pitchFamily="34" charset="0"/>
+                <a:ea typeface="Segoe UI Black" panose="020B0A02040204020203" pitchFamily="34" charset="0"/>
+              </a:rPr>
+              <a:t>.C</a:t>
+            </a:r>
+          </a:p>
+        </p:txBody>
+      </p:sp>
+    </p:spTree>
+    <p:extLst>
+      <p:ext uri="{BB962C8B-B14F-4D97-AF65-F5344CB8AC3E}">
+        <p14:creationId xmlns:p14="http://schemas.microsoft.com/office/powerpoint/2010/main" val="3027498096"/>
+      </p:ext>
+    </p:extLst>
+  </p:cSld>
+  <p:clrMapOvr>
+    <a:masterClrMapping/>
+  </p:clrMapOvr>
+</p:sld>
+</file>
+
+<file path=ppt/slides/slide5.xml><?xml version="1.0" encoding="utf-8"?>
+<p:sld xmlns:a="http://schemas.openxmlformats.org/drawingml/2006/main" xmlns:r="http://schemas.openxmlformats.org/officeDocument/2006/relationships" xmlns:p="http://schemas.openxmlformats.org/presentationml/2006/main">
+  <p:cSld>
+    <p:spTree>
+      <p:nvGrpSpPr>
+        <p:cNvPr id="1" name=""/>
+        <p:cNvGrpSpPr/>
+        <p:nvPr/>
+      </p:nvGrpSpPr>
+      <p:grpSpPr>
+        <a:xfrm>
+          <a:off x="0" y="0"/>
+          <a:ext cx="0" cy="0"/>
+          <a:chOff x="0" y="0"/>
+          <a:chExt cx="0" cy="0"/>
+        </a:xfrm>
+      </p:grpSpPr>
+      <p:pic>
+        <p:nvPicPr>
+          <p:cNvPr id="2" name="그림 1">
+            <a:extLst>
+              <a:ext uri="{FF2B5EF4-FFF2-40B4-BE49-F238E27FC236}">
+                <a16:creationId xmlns:a16="http://schemas.microsoft.com/office/drawing/2014/main" id="{69787609-F39F-4F9A-830F-BDBEF8387E40}"/>
+              </a:ext>
+            </a:extLst>
+          </p:cNvPr>
+          <p:cNvPicPr>
+            <a:picLocks noChangeAspect="1"/>
+          </p:cNvPicPr>
+          <p:nvPr/>
+        </p:nvPicPr>
+        <p:blipFill rotWithShape="1">
+          <a:blip r:embed="rId2">
+            <a:extLst>
+              <a:ext uri="{28A0092B-C50C-407E-A947-70E740481C1C}">
+                <a14:useLocalDpi xmlns:a14="http://schemas.microsoft.com/office/drawing/2010/main" val="0"/>
+              </a:ext>
+            </a:extLst>
+          </a:blip>
+          <a:srcRect l="15150" t="24924" r="15544" b="37655"/>
+          <a:stretch/>
+        </p:blipFill>
+        <p:spPr>
+          <a:xfrm>
+            <a:off x="2136711" y="2883159"/>
+            <a:ext cx="8133528" cy="2388637"/>
+          </a:xfrm>
+          <a:prstGeom prst="rect">
+            <a:avLst/>
+          </a:prstGeom>
+        </p:spPr>
+      </p:pic>
+    </p:spTree>
+    <p:extLst>
+      <p:ext uri="{BB962C8B-B14F-4D97-AF65-F5344CB8AC3E}">
+        <p14:creationId xmlns:p14="http://schemas.microsoft.com/office/powerpoint/2010/main" val="960335246"/>
       </p:ext>
     </p:extLst>
   </p:cSld>

</xml_diff>